<commit_message>
Updated via the Open Science Framework
</commit_message>
<xml_diff>
--- a/Codice/Codice_FT_Emotions/FT_Emotion.pptx
+++ b/Codice/Codice_FT_Emotions/FT_Emotion.pptx
@@ -14,8 +14,11 @@
     <p:sldId id="271" r:id="rId8"/>
     <p:sldId id="272" r:id="rId9"/>
     <p:sldId id="273" r:id="rId10"/>
-    <p:sldId id="274" r:id="rId11"/>
-    <p:sldId id="275" r:id="rId12"/>
+    <p:sldId id="276" r:id="rId11"/>
+    <p:sldId id="274" r:id="rId12"/>
+    <p:sldId id="277" r:id="rId13"/>
+    <p:sldId id="278" r:id="rId14"/>
+    <p:sldId id="275" r:id="rId15"/>
   </p:sldIdLst>
   <p:sldSz cx="12192000" cy="6858000"/>
   <p:notesSz cx="6858000" cy="9144000"/>
@@ -3483,14 +3486,234 @@
         </p:nvSpPr>
         <p:spPr>
           <a:xfrm>
-            <a:off x="159798" y="79899"/>
-            <a:ext cx="12032202" cy="1251751"/>
+            <a:off x="159798" y="79900"/>
+            <a:ext cx="12032202" cy="896644"/>
           </a:xfrm>
         </p:spPr>
         <p:txBody>
           <a:bodyPr/>
           <a:lstStyle/>
           <a:p>
+            <a:pPr algn="ctr"/>
+            <a:r>
+              <a:rPr lang="it-IT" b="1" i="1" u="sng" dirty="0">
+                <a:solidFill>
+                  <a:srgbClr val="FF0000"/>
+                </a:solidFill>
+              </a:rPr>
+              <a:t>PROVA SUI NOSTRI DATI</a:t>
+            </a:r>
+          </a:p>
+        </p:txBody>
+      </p:sp>
+      <p:sp>
+        <p:nvSpPr>
+          <p:cNvPr id="3" name="Segnaposto contenuto 2">
+            <a:extLst>
+              <a:ext uri="{FF2B5EF4-FFF2-40B4-BE49-F238E27FC236}">
+                <a16:creationId xmlns:a16="http://schemas.microsoft.com/office/drawing/2014/main" id="{F50634DF-B445-49ED-9F5B-2650A89C0BFF}"/>
+              </a:ext>
+            </a:extLst>
+          </p:cNvPr>
+          <p:cNvSpPr>
+            <a:spLocks noGrp="1"/>
+          </p:cNvSpPr>
+          <p:nvPr>
+            <p:ph idx="1"/>
+          </p:nvPr>
+        </p:nvSpPr>
+        <p:spPr>
+          <a:xfrm>
+            <a:off x="97653" y="976544"/>
+            <a:ext cx="11967100" cy="5810436"/>
+          </a:xfrm>
+        </p:spPr>
+        <p:txBody>
+          <a:bodyPr>
+            <a:normAutofit fontScale="92500" lnSpcReduction="10000"/>
+          </a:bodyPr>
+          <a:lstStyle/>
+          <a:p>
+            <a:pPr lvl="1"/>
+            <a:r>
+              <a:rPr lang="it-IT" dirty="0"/>
+              <a:t>A questo punto, come fatto per </a:t>
+            </a:r>
+            <a:r>
+              <a:rPr lang="it-IT" dirty="0" err="1"/>
+              <a:t>polarity</a:t>
+            </a:r>
+            <a:r>
+              <a:rPr lang="it-IT" dirty="0"/>
+              <a:t> proviamo ad effettuare una prova di </a:t>
+            </a:r>
+            <a:r>
+              <a:rPr lang="it-IT" dirty="0" err="1"/>
+              <a:t>prediction</a:t>
+            </a:r>
+            <a:r>
+              <a:rPr lang="it-IT" dirty="0"/>
+              <a:t> sui nostri dati originali</a:t>
+            </a:r>
+          </a:p>
+          <a:p>
+            <a:pPr marL="457200" lvl="1" indent="0">
+              <a:buNone/>
+            </a:pPr>
+            <a:endParaRPr lang="it-IT" dirty="0"/>
+          </a:p>
+          <a:p>
+            <a:pPr lvl="1"/>
+            <a:r>
+              <a:rPr lang="it-IT" dirty="0"/>
+              <a:t>La strategia è quella di raccogliere l’emozione dominante per ogni frase, creando per ogni recensione un bagaglio di emozioni</a:t>
+            </a:r>
+          </a:p>
+          <a:p>
+            <a:pPr marL="457200" lvl="1" indent="0">
+              <a:buNone/>
+            </a:pPr>
+            <a:endParaRPr lang="it-IT" dirty="0"/>
+          </a:p>
+          <a:p>
+            <a:pPr lvl="1"/>
+            <a:r>
+              <a:rPr lang="it-IT" dirty="0"/>
+              <a:t>Prendiamo un campione di 10000 recensioni tra le reviews degli </a:t>
+            </a:r>
+            <a:r>
+              <a:rPr lang="it-IT" dirty="0" err="1"/>
+              <a:t>shared</a:t>
+            </a:r>
+            <a:r>
+              <a:rPr lang="it-IT" dirty="0"/>
+              <a:t> books tra le 3 lingue (5000 per piattaforma, per ogni lingua, come per </a:t>
+            </a:r>
+            <a:r>
+              <a:rPr lang="it-IT" dirty="0" err="1"/>
+              <a:t>polarity</a:t>
+            </a:r>
+            <a:r>
+              <a:rPr lang="it-IT" dirty="0"/>
+              <a:t>), e ne </a:t>
+            </a:r>
+            <a:r>
+              <a:rPr lang="it-IT" dirty="0" err="1"/>
+              <a:t>printiamo</a:t>
+            </a:r>
+            <a:r>
+              <a:rPr lang="it-IT" dirty="0"/>
+              <a:t> un paio di pie chart per vedere se è tutto ok</a:t>
+            </a:r>
+          </a:p>
+          <a:p>
+            <a:pPr marL="457200" lvl="1" indent="0">
+              <a:buNone/>
+            </a:pPr>
+            <a:endParaRPr lang="it-IT" dirty="0"/>
+          </a:p>
+          <a:p>
+            <a:pPr lvl="1"/>
+            <a:r>
+              <a:rPr lang="it-IT" dirty="0"/>
+              <a:t>Si effettuano i seguenti controlli nei 2 grafici che vengono prodotti per ogni lingua:</a:t>
+            </a:r>
+          </a:p>
+          <a:p>
+            <a:pPr lvl="2"/>
+            <a:r>
+              <a:rPr lang="it-IT" dirty="0"/>
+              <a:t>Vogliamo accertarci che il numero di emozioni predette per ogni review non presenti dei pattern viziosi, per cui ci chiediamo: in percentuale, quante recensioni presentano un bagaglio di 1,2,3,4,5 oppure 6 emozioni? </a:t>
+            </a:r>
+          </a:p>
+          <a:p>
+            <a:pPr lvl="2"/>
+            <a:r>
+              <a:rPr lang="it-IT" dirty="0"/>
+              <a:t> Vogliamo vedere la distribuzione in percentuale delle emozioni presenti nelle nostre borse di emozioni, che non rappresenta la distribuzione % delle emozioni restituite dal modello, perché in ogni borsa vengono rimossi i duplicati. Nel senso, se una review è formata da 9 frasi, la sua borsa potrà al massimo contenere le 6 emozioni da noi scelte per addestrare il modello</a:t>
+            </a:r>
+          </a:p>
+          <a:p>
+            <a:pPr lvl="1"/>
+            <a:endParaRPr lang="it-IT" dirty="0"/>
+          </a:p>
+          <a:p>
+            <a:pPr lvl="1"/>
+            <a:r>
+              <a:rPr lang="it-IT" dirty="0"/>
+              <a:t>Nelle seguenti slide vedremo i risultati</a:t>
+            </a:r>
+          </a:p>
+          <a:p>
+            <a:endParaRPr lang="it-IT" dirty="0"/>
+          </a:p>
+        </p:txBody>
+      </p:sp>
+    </p:spTree>
+    <p:extLst>
+      <p:ext uri="{BB962C8B-B14F-4D97-AF65-F5344CB8AC3E}">
+        <p14:creationId xmlns:p14="http://schemas.microsoft.com/office/powerpoint/2010/main" val="3758927122"/>
+      </p:ext>
+    </p:extLst>
+  </p:cSld>
+  <p:clrMapOvr>
+    <a:masterClrMapping/>
+  </p:clrMapOvr>
+</p:sld>
+</file>
+
+<file path=ppt/slides/slide11.xml><?xml version="1.0" encoding="utf-8"?>
+<p:sld xmlns:a="http://schemas.openxmlformats.org/drawingml/2006/main" xmlns:r="http://schemas.openxmlformats.org/officeDocument/2006/relationships" xmlns:p="http://schemas.openxmlformats.org/presentationml/2006/main">
+  <p:cSld>
+    <p:spTree>
+      <p:nvGrpSpPr>
+        <p:cNvPr id="1" name=""/>
+        <p:cNvGrpSpPr/>
+        <p:nvPr/>
+      </p:nvGrpSpPr>
+      <p:grpSpPr>
+        <a:xfrm>
+          <a:off x="0" y="0"/>
+          <a:ext cx="0" cy="0"/>
+          <a:chOff x="0" y="0"/>
+          <a:chExt cx="0" cy="0"/>
+        </a:xfrm>
+      </p:grpSpPr>
+      <p:sp>
+        <p:nvSpPr>
+          <p:cNvPr id="2" name="Titolo 1">
+            <a:extLst>
+              <a:ext uri="{FF2B5EF4-FFF2-40B4-BE49-F238E27FC236}">
+                <a16:creationId xmlns:a16="http://schemas.microsoft.com/office/drawing/2014/main" id="{0D18ECDC-59A8-4F8A-ABE4-9F86965B792A}"/>
+              </a:ext>
+            </a:extLst>
+          </p:cNvPr>
+          <p:cNvSpPr>
+            <a:spLocks noGrp="1"/>
+          </p:cNvSpPr>
+          <p:nvPr>
+            <p:ph type="title"/>
+          </p:nvPr>
+        </p:nvSpPr>
+        <p:spPr>
+          <a:xfrm>
+            <a:off x="159798" y="79899"/>
+            <a:ext cx="12032202" cy="1056443"/>
+          </a:xfrm>
+        </p:spPr>
+        <p:txBody>
+          <a:bodyPr/>
+          <a:lstStyle/>
+          <a:p>
+            <a:pPr algn="ctr"/>
+            <a:r>
+              <a:rPr lang="it-IT" b="1" i="1" u="sng" dirty="0">
+                <a:solidFill>
+                  <a:srgbClr val="FF0000"/>
+                </a:solidFill>
+              </a:rPr>
+              <a:t>RISULTATI EN</a:t>
+            </a:r>
             <a:endParaRPr lang="it-IT" dirty="0"/>
           </a:p>
         </p:txBody>
@@ -3521,10 +3744,145 @@
           <a:bodyPr/>
           <a:lstStyle/>
           <a:p>
-            <a:endParaRPr lang="it-IT" dirty="0"/>
-          </a:p>
-        </p:txBody>
-      </p:sp>
+            <a:r>
+              <a:rPr lang="it-IT" dirty="0"/>
+              <a:t>La maggior parte delle </a:t>
+            </a:r>
+            <a:r>
+              <a:rPr lang="it-IT" dirty="0" err="1"/>
+              <a:t>bag</a:t>
+            </a:r>
+            <a:r>
+              <a:rPr lang="it-IT" dirty="0"/>
+              <a:t> of </a:t>
+            </a:r>
+            <a:r>
+              <a:rPr lang="it-IT" dirty="0" err="1"/>
+              <a:t>emotions</a:t>
+            </a:r>
+            <a:r>
+              <a:rPr lang="it-IT" dirty="0"/>
+              <a:t> contengono 1-2 </a:t>
+            </a:r>
+            <a:r>
+              <a:rPr lang="it-IT" dirty="0" err="1"/>
+              <a:t>emozion</a:t>
+            </a:r>
+            <a:r>
+              <a:rPr lang="it-IT" dirty="0"/>
+              <a:t>, a scalare al ribasso fino a 6</a:t>
+            </a:r>
+          </a:p>
+          <a:p>
+            <a:r>
+              <a:rPr lang="it-IT" dirty="0"/>
+              <a:t>Le classi Joy e </a:t>
+            </a:r>
+            <a:r>
+              <a:rPr lang="it-IT" dirty="0" err="1"/>
+              <a:t>Neutral</a:t>
+            </a:r>
+            <a:r>
+              <a:rPr lang="it-IT" dirty="0"/>
+              <a:t> sono quelle più presenti</a:t>
+            </a:r>
+          </a:p>
+        </p:txBody>
+      </p:sp>
+      <p:pic>
+        <p:nvPicPr>
+          <p:cNvPr id="1026" name="Picture 2">
+            <a:extLst>
+              <a:ext uri="{FF2B5EF4-FFF2-40B4-BE49-F238E27FC236}">
+                <a16:creationId xmlns:a16="http://schemas.microsoft.com/office/drawing/2014/main" id="{01085871-E2A3-4F03-8927-E67D518FE881}"/>
+              </a:ext>
+            </a:extLst>
+          </p:cNvPr>
+          <p:cNvPicPr>
+            <a:picLocks noChangeAspect="1" noChangeArrowheads="1"/>
+          </p:cNvPicPr>
+          <p:nvPr/>
+        </p:nvPicPr>
+        <p:blipFill>
+          <a:blip r:embed="rId2">
+            <a:extLst>
+              <a:ext uri="{28A0092B-C50C-407E-A947-70E740481C1C}">
+                <a14:useLocalDpi xmlns:a14="http://schemas.microsoft.com/office/drawing/2010/main" val="0"/>
+              </a:ext>
+            </a:extLst>
+          </a:blip>
+          <a:srcRect/>
+          <a:stretch>
+            <a:fillRect/>
+          </a:stretch>
+        </p:blipFill>
+        <p:spPr bwMode="auto">
+          <a:xfrm>
+            <a:off x="1919288" y="3082720"/>
+            <a:ext cx="3195637" cy="3416980"/>
+          </a:xfrm>
+          <a:prstGeom prst="rect">
+            <a:avLst/>
+          </a:prstGeom>
+          <a:noFill/>
+          <a:extLst>
+            <a:ext uri="{909E8E84-426E-40DD-AFC4-6F175D3DCCD1}">
+              <a14:hiddenFill xmlns:a14="http://schemas.microsoft.com/office/drawing/2010/main">
+                <a:solidFill>
+                  <a:srgbClr val="FFFFFF"/>
+                </a:solidFill>
+              </a14:hiddenFill>
+            </a:ext>
+          </a:extLst>
+        </p:spPr>
+      </p:pic>
+      <p:pic>
+        <p:nvPicPr>
+          <p:cNvPr id="1028" name="Picture 4">
+            <a:extLst>
+              <a:ext uri="{FF2B5EF4-FFF2-40B4-BE49-F238E27FC236}">
+                <a16:creationId xmlns:a16="http://schemas.microsoft.com/office/drawing/2014/main" id="{B219483E-382E-4F5F-9B62-815518959269}"/>
+              </a:ext>
+            </a:extLst>
+          </p:cNvPr>
+          <p:cNvPicPr>
+            <a:picLocks noChangeAspect="1" noChangeArrowheads="1"/>
+          </p:cNvPicPr>
+          <p:nvPr/>
+        </p:nvPicPr>
+        <p:blipFill>
+          <a:blip r:embed="rId3">
+            <a:extLst>
+              <a:ext uri="{28A0092B-C50C-407E-A947-70E740481C1C}">
+                <a14:useLocalDpi xmlns:a14="http://schemas.microsoft.com/office/drawing/2010/main" val="0"/>
+              </a:ext>
+            </a:extLst>
+          </a:blip>
+          <a:srcRect/>
+          <a:stretch>
+            <a:fillRect/>
+          </a:stretch>
+        </p:blipFill>
+        <p:spPr bwMode="auto">
+          <a:xfrm>
+            <a:off x="7267575" y="3174381"/>
+            <a:ext cx="3109913" cy="3325319"/>
+          </a:xfrm>
+          <a:prstGeom prst="rect">
+            <a:avLst/>
+          </a:prstGeom>
+          <a:noFill/>
+          <a:extLst>
+            <a:ext uri="{909E8E84-426E-40DD-AFC4-6F175D3DCCD1}">
+              <a14:hiddenFill xmlns:a14="http://schemas.microsoft.com/office/drawing/2010/main">
+                <a:solidFill>
+                  <a:srgbClr val="FFFFFF"/>
+                </a:solidFill>
+              </a14:hiddenFill>
+            </a:ext>
+          </a:extLst>
+        </p:spPr>
+      </p:pic>
     </p:spTree>
     <p:extLst>
       <p:ext uri="{BB962C8B-B14F-4D97-AF65-F5344CB8AC3E}">
@@ -3538,7 +3896,456 @@
 </p:sld>
 </file>
 
-<file path=ppt/slides/slide11.xml><?xml version="1.0" encoding="utf-8"?>
+<file path=ppt/slides/slide12.xml><?xml version="1.0" encoding="utf-8"?>
+<p:sld xmlns:a="http://schemas.openxmlformats.org/drawingml/2006/main" xmlns:r="http://schemas.openxmlformats.org/officeDocument/2006/relationships" xmlns:p="http://schemas.openxmlformats.org/presentationml/2006/main">
+  <p:cSld>
+    <p:spTree>
+      <p:nvGrpSpPr>
+        <p:cNvPr id="1" name=""/>
+        <p:cNvGrpSpPr/>
+        <p:nvPr/>
+      </p:nvGrpSpPr>
+      <p:grpSpPr>
+        <a:xfrm>
+          <a:off x="0" y="0"/>
+          <a:ext cx="0" cy="0"/>
+          <a:chOff x="0" y="0"/>
+          <a:chExt cx="0" cy="0"/>
+        </a:xfrm>
+      </p:grpSpPr>
+      <p:sp>
+        <p:nvSpPr>
+          <p:cNvPr id="2" name="Titolo 1">
+            <a:extLst>
+              <a:ext uri="{FF2B5EF4-FFF2-40B4-BE49-F238E27FC236}">
+                <a16:creationId xmlns:a16="http://schemas.microsoft.com/office/drawing/2014/main" id="{0D18ECDC-59A8-4F8A-ABE4-9F86965B792A}"/>
+              </a:ext>
+            </a:extLst>
+          </p:cNvPr>
+          <p:cNvSpPr>
+            <a:spLocks noGrp="1"/>
+          </p:cNvSpPr>
+          <p:nvPr>
+            <p:ph type="title"/>
+          </p:nvPr>
+        </p:nvSpPr>
+        <p:spPr>
+          <a:xfrm>
+            <a:off x="159798" y="79899"/>
+            <a:ext cx="12032202" cy="1056443"/>
+          </a:xfrm>
+        </p:spPr>
+        <p:txBody>
+          <a:bodyPr/>
+          <a:lstStyle/>
+          <a:p>
+            <a:pPr algn="ctr"/>
+            <a:r>
+              <a:rPr lang="it-IT" b="1" i="1" u="sng" dirty="0">
+                <a:solidFill>
+                  <a:srgbClr val="FF0000"/>
+                </a:solidFill>
+              </a:rPr>
+              <a:t>RISULTATI IT</a:t>
+            </a:r>
+            <a:endParaRPr lang="it-IT" dirty="0"/>
+          </a:p>
+        </p:txBody>
+      </p:sp>
+      <p:sp>
+        <p:nvSpPr>
+          <p:cNvPr id="3" name="Segnaposto contenuto 2">
+            <a:extLst>
+              <a:ext uri="{FF2B5EF4-FFF2-40B4-BE49-F238E27FC236}">
+                <a16:creationId xmlns:a16="http://schemas.microsoft.com/office/drawing/2014/main" id="{F50634DF-B445-49ED-9F5B-2650A89C0BFF}"/>
+              </a:ext>
+            </a:extLst>
+          </p:cNvPr>
+          <p:cNvSpPr>
+            <a:spLocks noGrp="1"/>
+          </p:cNvSpPr>
+          <p:nvPr>
+            <p:ph idx="1"/>
+          </p:nvPr>
+        </p:nvSpPr>
+        <p:spPr>
+          <a:xfrm>
+            <a:off x="97653" y="1411550"/>
+            <a:ext cx="11967100" cy="5366551"/>
+          </a:xfrm>
+        </p:spPr>
+        <p:txBody>
+          <a:bodyPr/>
+          <a:lstStyle/>
+          <a:p>
+            <a:r>
+              <a:rPr lang="it-IT" dirty="0"/>
+              <a:t>La maggior parte delle </a:t>
+            </a:r>
+            <a:r>
+              <a:rPr lang="it-IT" dirty="0" err="1"/>
+              <a:t>bag</a:t>
+            </a:r>
+            <a:r>
+              <a:rPr lang="it-IT" dirty="0"/>
+              <a:t> of </a:t>
+            </a:r>
+            <a:r>
+              <a:rPr lang="it-IT" dirty="0" err="1"/>
+              <a:t>emotions</a:t>
+            </a:r>
+            <a:r>
+              <a:rPr lang="it-IT" dirty="0"/>
+              <a:t> contengono 1-2-3 emozione, a scalare al ribasso fino a 6</a:t>
+            </a:r>
+          </a:p>
+          <a:p>
+            <a:r>
+              <a:rPr lang="it-IT" dirty="0"/>
+              <a:t>Le classi Joy e </a:t>
+            </a:r>
+            <a:r>
+              <a:rPr lang="it-IT" dirty="0" err="1"/>
+              <a:t>Neutral</a:t>
+            </a:r>
+            <a:r>
+              <a:rPr lang="it-IT" dirty="0"/>
+              <a:t> sono quelle più presenti. Situazione generale simile ad EN</a:t>
+            </a:r>
+          </a:p>
+        </p:txBody>
+      </p:sp>
+      <p:pic>
+        <p:nvPicPr>
+          <p:cNvPr id="2052" name="Picture 4">
+            <a:extLst>
+              <a:ext uri="{FF2B5EF4-FFF2-40B4-BE49-F238E27FC236}">
+                <a16:creationId xmlns:a16="http://schemas.microsoft.com/office/drawing/2014/main" id="{38B26DC6-EC9D-4081-85F9-EAB0064CA7F7}"/>
+              </a:ext>
+            </a:extLst>
+          </p:cNvPr>
+          <p:cNvPicPr>
+            <a:picLocks noChangeAspect="1" noChangeArrowheads="1"/>
+          </p:cNvPicPr>
+          <p:nvPr/>
+        </p:nvPicPr>
+        <p:blipFill>
+          <a:blip r:embed="rId2">
+            <a:extLst>
+              <a:ext uri="{28A0092B-C50C-407E-A947-70E740481C1C}">
+                <a14:useLocalDpi xmlns:a14="http://schemas.microsoft.com/office/drawing/2010/main" val="0"/>
+              </a:ext>
+            </a:extLst>
+          </a:blip>
+          <a:srcRect/>
+          <a:stretch>
+            <a:fillRect/>
+          </a:stretch>
+        </p:blipFill>
+        <p:spPr bwMode="auto">
+          <a:xfrm>
+            <a:off x="1854141" y="3186200"/>
+            <a:ext cx="3327459" cy="3557932"/>
+          </a:xfrm>
+          <a:prstGeom prst="rect">
+            <a:avLst/>
+          </a:prstGeom>
+          <a:noFill/>
+          <a:extLst>
+            <a:ext uri="{909E8E84-426E-40DD-AFC4-6F175D3DCCD1}">
+              <a14:hiddenFill xmlns:a14="http://schemas.microsoft.com/office/drawing/2010/main">
+                <a:solidFill>
+                  <a:srgbClr val="FFFFFF"/>
+                </a:solidFill>
+              </a14:hiddenFill>
+            </a:ext>
+          </a:extLst>
+        </p:spPr>
+      </p:pic>
+      <p:pic>
+        <p:nvPicPr>
+          <p:cNvPr id="2054" name="Picture 6">
+            <a:extLst>
+              <a:ext uri="{FF2B5EF4-FFF2-40B4-BE49-F238E27FC236}">
+                <a16:creationId xmlns:a16="http://schemas.microsoft.com/office/drawing/2014/main" id="{42C33453-E14E-4264-92E0-5B715E409D07}"/>
+              </a:ext>
+            </a:extLst>
+          </p:cNvPr>
+          <p:cNvPicPr>
+            <a:picLocks noChangeAspect="1" noChangeArrowheads="1"/>
+          </p:cNvPicPr>
+          <p:nvPr/>
+        </p:nvPicPr>
+        <p:blipFill>
+          <a:blip r:embed="rId3">
+            <a:extLst>
+              <a:ext uri="{28A0092B-C50C-407E-A947-70E740481C1C}">
+                <a14:useLocalDpi xmlns:a14="http://schemas.microsoft.com/office/drawing/2010/main" val="0"/>
+              </a:ext>
+            </a:extLst>
+          </a:blip>
+          <a:srcRect/>
+          <a:stretch>
+            <a:fillRect/>
+          </a:stretch>
+        </p:blipFill>
+        <p:spPr bwMode="auto">
+          <a:xfrm>
+            <a:off x="6265048" y="3306049"/>
+            <a:ext cx="3321865" cy="3551951"/>
+          </a:xfrm>
+          <a:prstGeom prst="rect">
+            <a:avLst/>
+          </a:prstGeom>
+          <a:noFill/>
+          <a:extLst>
+            <a:ext uri="{909E8E84-426E-40DD-AFC4-6F175D3DCCD1}">
+              <a14:hiddenFill xmlns:a14="http://schemas.microsoft.com/office/drawing/2010/main">
+                <a:solidFill>
+                  <a:srgbClr val="FFFFFF"/>
+                </a:solidFill>
+              </a14:hiddenFill>
+            </a:ext>
+          </a:extLst>
+        </p:spPr>
+      </p:pic>
+    </p:spTree>
+    <p:extLst>
+      <p:ext uri="{BB962C8B-B14F-4D97-AF65-F5344CB8AC3E}">
+        <p14:creationId xmlns:p14="http://schemas.microsoft.com/office/powerpoint/2010/main" val="1661223847"/>
+      </p:ext>
+    </p:extLst>
+  </p:cSld>
+  <p:clrMapOvr>
+    <a:masterClrMapping/>
+  </p:clrMapOvr>
+</p:sld>
+</file>
+
+<file path=ppt/slides/slide13.xml><?xml version="1.0" encoding="utf-8"?>
+<p:sld xmlns:a="http://schemas.openxmlformats.org/drawingml/2006/main" xmlns:r="http://schemas.openxmlformats.org/officeDocument/2006/relationships" xmlns:p="http://schemas.openxmlformats.org/presentationml/2006/main">
+  <p:cSld>
+    <p:spTree>
+      <p:nvGrpSpPr>
+        <p:cNvPr id="1" name=""/>
+        <p:cNvGrpSpPr/>
+        <p:nvPr/>
+      </p:nvGrpSpPr>
+      <p:grpSpPr>
+        <a:xfrm>
+          <a:off x="0" y="0"/>
+          <a:ext cx="0" cy="0"/>
+          <a:chOff x="0" y="0"/>
+          <a:chExt cx="0" cy="0"/>
+        </a:xfrm>
+      </p:grpSpPr>
+      <p:sp>
+        <p:nvSpPr>
+          <p:cNvPr id="2" name="Titolo 1">
+            <a:extLst>
+              <a:ext uri="{FF2B5EF4-FFF2-40B4-BE49-F238E27FC236}">
+                <a16:creationId xmlns:a16="http://schemas.microsoft.com/office/drawing/2014/main" id="{0D18ECDC-59A8-4F8A-ABE4-9F86965B792A}"/>
+              </a:ext>
+            </a:extLst>
+          </p:cNvPr>
+          <p:cNvSpPr>
+            <a:spLocks noGrp="1"/>
+          </p:cNvSpPr>
+          <p:nvPr>
+            <p:ph type="title"/>
+          </p:nvPr>
+        </p:nvSpPr>
+        <p:spPr>
+          <a:xfrm>
+            <a:off x="159798" y="79899"/>
+            <a:ext cx="12032202" cy="1056443"/>
+          </a:xfrm>
+        </p:spPr>
+        <p:txBody>
+          <a:bodyPr/>
+          <a:lstStyle/>
+          <a:p>
+            <a:pPr algn="ctr"/>
+            <a:r>
+              <a:rPr lang="it-IT" b="1" i="1" u="sng" dirty="0">
+                <a:solidFill>
+                  <a:srgbClr val="FF0000"/>
+                </a:solidFill>
+              </a:rPr>
+              <a:t>RISULTATI EN</a:t>
+            </a:r>
+            <a:endParaRPr lang="it-IT" dirty="0"/>
+          </a:p>
+        </p:txBody>
+      </p:sp>
+      <p:sp>
+        <p:nvSpPr>
+          <p:cNvPr id="3" name="Segnaposto contenuto 2">
+            <a:extLst>
+              <a:ext uri="{FF2B5EF4-FFF2-40B4-BE49-F238E27FC236}">
+                <a16:creationId xmlns:a16="http://schemas.microsoft.com/office/drawing/2014/main" id="{F50634DF-B445-49ED-9F5B-2650A89C0BFF}"/>
+              </a:ext>
+            </a:extLst>
+          </p:cNvPr>
+          <p:cNvSpPr>
+            <a:spLocks noGrp="1"/>
+          </p:cNvSpPr>
+          <p:nvPr>
+            <p:ph idx="1"/>
+          </p:nvPr>
+        </p:nvSpPr>
+        <p:spPr>
+          <a:xfrm>
+            <a:off x="97653" y="1411550"/>
+            <a:ext cx="11967100" cy="5366551"/>
+          </a:xfrm>
+        </p:spPr>
+        <p:txBody>
+          <a:bodyPr/>
+          <a:lstStyle/>
+          <a:p>
+            <a:r>
+              <a:rPr lang="it-IT" dirty="0"/>
+              <a:t>La maggior parte delle </a:t>
+            </a:r>
+            <a:r>
+              <a:rPr lang="it-IT" dirty="0" err="1"/>
+              <a:t>bag</a:t>
+            </a:r>
+            <a:r>
+              <a:rPr lang="it-IT" dirty="0"/>
+              <a:t> of </a:t>
+            </a:r>
+            <a:r>
+              <a:rPr lang="it-IT" dirty="0" err="1"/>
+              <a:t>emotions</a:t>
+            </a:r>
+            <a:r>
+              <a:rPr lang="it-IT" dirty="0"/>
+              <a:t> contengono 5-6 emozioni, funziona al contrario rispetto alle altre lingue, in quanto le recensioni sono + lunghe</a:t>
+            </a:r>
+          </a:p>
+          <a:p>
+            <a:r>
+              <a:rPr lang="it-IT" dirty="0"/>
+              <a:t>Le classi sono equilibrate in </a:t>
+            </a:r>
+            <a:r>
+              <a:rPr lang="it-IT"/>
+              <a:t>questo campione</a:t>
+            </a:r>
+            <a:endParaRPr lang="it-IT" dirty="0"/>
+          </a:p>
+        </p:txBody>
+      </p:sp>
+      <p:pic>
+        <p:nvPicPr>
+          <p:cNvPr id="3074" name="Picture 2">
+            <a:extLst>
+              <a:ext uri="{FF2B5EF4-FFF2-40B4-BE49-F238E27FC236}">
+                <a16:creationId xmlns:a16="http://schemas.microsoft.com/office/drawing/2014/main" id="{0C8DD977-94E9-4751-86BC-C3A2AA85307E}"/>
+              </a:ext>
+            </a:extLst>
+          </p:cNvPr>
+          <p:cNvPicPr>
+            <a:picLocks noChangeAspect="1" noChangeArrowheads="1"/>
+          </p:cNvPicPr>
+          <p:nvPr/>
+        </p:nvPicPr>
+        <p:blipFill>
+          <a:blip r:embed="rId2">
+            <a:extLst>
+              <a:ext uri="{28A0092B-C50C-407E-A947-70E740481C1C}">
+                <a14:useLocalDpi xmlns:a14="http://schemas.microsoft.com/office/drawing/2010/main" val="0"/>
+              </a:ext>
+            </a:extLst>
+          </a:blip>
+          <a:srcRect/>
+          <a:stretch>
+            <a:fillRect/>
+          </a:stretch>
+        </p:blipFill>
+        <p:spPr bwMode="auto">
+          <a:xfrm>
+            <a:off x="2290763" y="3114677"/>
+            <a:ext cx="3224212" cy="3224212"/>
+          </a:xfrm>
+          <a:prstGeom prst="rect">
+            <a:avLst/>
+          </a:prstGeom>
+          <a:noFill/>
+          <a:extLst>
+            <a:ext uri="{909E8E84-426E-40DD-AFC4-6F175D3DCCD1}">
+              <a14:hiddenFill xmlns:a14="http://schemas.microsoft.com/office/drawing/2010/main">
+                <a:solidFill>
+                  <a:srgbClr val="FFFFFF"/>
+                </a:solidFill>
+              </a14:hiddenFill>
+            </a:ext>
+          </a:extLst>
+        </p:spPr>
+      </p:pic>
+      <p:pic>
+        <p:nvPicPr>
+          <p:cNvPr id="3076" name="Picture 4">
+            <a:extLst>
+              <a:ext uri="{FF2B5EF4-FFF2-40B4-BE49-F238E27FC236}">
+                <a16:creationId xmlns:a16="http://schemas.microsoft.com/office/drawing/2014/main" id="{B4B94B03-1AC1-439D-86B5-9932C5176FD1}"/>
+              </a:ext>
+            </a:extLst>
+          </p:cNvPr>
+          <p:cNvPicPr>
+            <a:picLocks noChangeAspect="1" noChangeArrowheads="1"/>
+          </p:cNvPicPr>
+          <p:nvPr/>
+        </p:nvPicPr>
+        <p:blipFill>
+          <a:blip r:embed="rId3">
+            <a:extLst>
+              <a:ext uri="{28A0092B-C50C-407E-A947-70E740481C1C}">
+                <a14:useLocalDpi xmlns:a14="http://schemas.microsoft.com/office/drawing/2010/main" val="0"/>
+              </a:ext>
+            </a:extLst>
+          </a:blip>
+          <a:srcRect/>
+          <a:stretch>
+            <a:fillRect/>
+          </a:stretch>
+        </p:blipFill>
+        <p:spPr bwMode="auto">
+          <a:xfrm>
+            <a:off x="7001545" y="3114677"/>
+            <a:ext cx="3224212" cy="3224212"/>
+          </a:xfrm>
+          <a:prstGeom prst="rect">
+            <a:avLst/>
+          </a:prstGeom>
+          <a:noFill/>
+          <a:extLst>
+            <a:ext uri="{909E8E84-426E-40DD-AFC4-6F175D3DCCD1}">
+              <a14:hiddenFill xmlns:a14="http://schemas.microsoft.com/office/drawing/2010/main">
+                <a:solidFill>
+                  <a:srgbClr val="FFFFFF"/>
+                </a:solidFill>
+              </a14:hiddenFill>
+            </a:ext>
+          </a:extLst>
+        </p:spPr>
+      </p:pic>
+    </p:spTree>
+    <p:extLst>
+      <p:ext uri="{BB962C8B-B14F-4D97-AF65-F5344CB8AC3E}">
+        <p14:creationId xmlns:p14="http://schemas.microsoft.com/office/powerpoint/2010/main" val="2903187441"/>
+      </p:ext>
+    </p:extLst>
+  </p:cSld>
+  <p:clrMapOvr>
+    <a:masterClrMapping/>
+  </p:clrMapOvr>
+</p:sld>
+</file>
+
+<file path=ppt/slides/slide14.xml><?xml version="1.0" encoding="utf-8"?>
 <p:sld xmlns:a="http://schemas.openxmlformats.org/drawingml/2006/main" xmlns:r="http://schemas.openxmlformats.org/officeDocument/2006/relationships" xmlns:p="http://schemas.openxmlformats.org/presentationml/2006/main">
   <p:cSld>
     <p:spTree>

</xml_diff>